<commit_message>
Updated day 2 demos
</commit_message>
<xml_diff>
--- a/day2/Elixir - Day 2.pptx
+++ b/day2/Elixir - Day 2.pptx
@@ -1045,7 +1045,7 @@
           </a:ln>
           <a:extLst>
             <a:ext uri="{C572A759-6A51-4108-AA02-DFA0A04FC94B}">
-              <ma14:wrappingTextBoxFlag xmlns="" xmlns:ma14="http://schemas.microsoft.com/office/mac/drawingml/2011/main" xmlns:a14="http://schemas.microsoft.com/office/drawing/2010/main" xmlns:m="http://schemas.openxmlformats.org/officeDocument/2006/math" val="1"/>
+              <ma14:wrappingTextBoxFlag xmlns:m="http://schemas.openxmlformats.org/officeDocument/2006/math" xmlns:a14="http://schemas.microsoft.com/office/drawing/2010/main" xmlns:ma14="http://schemas.microsoft.com/office/mac/drawingml/2011/main" xmlns="" val="1"/>
             </a:ext>
           </a:extLst>
         </p:spPr>
@@ -1320,7 +1320,7 @@
           </a:ln>
           <a:extLst>
             <a:ext uri="{C572A759-6A51-4108-AA02-DFA0A04FC94B}">
-              <ma14:wrappingTextBoxFlag xmlns="" xmlns:ma14="http://schemas.microsoft.com/office/mac/drawingml/2011/main" xmlns:a14="http://schemas.microsoft.com/office/drawing/2010/main" xmlns:m="http://schemas.openxmlformats.org/officeDocument/2006/math" val="1"/>
+              <ma14:wrappingTextBoxFlag xmlns:m="http://schemas.openxmlformats.org/officeDocument/2006/math" xmlns:a14="http://schemas.microsoft.com/office/drawing/2010/main" xmlns:ma14="http://schemas.microsoft.com/office/mac/drawingml/2011/main" xmlns="" val="1"/>
             </a:ext>
           </a:extLst>
         </p:spPr>
@@ -1759,7 +1759,7 @@
           </a:ln>
           <a:extLst>
             <a:ext uri="{C572A759-6A51-4108-AA02-DFA0A04FC94B}">
-              <ma14:wrappingTextBoxFlag xmlns="" xmlns:ma14="http://schemas.microsoft.com/office/mac/drawingml/2011/main" xmlns:a14="http://schemas.microsoft.com/office/drawing/2010/main" xmlns:m="http://schemas.openxmlformats.org/officeDocument/2006/math" val="1"/>
+              <ma14:wrappingTextBoxFlag xmlns:m="http://schemas.openxmlformats.org/officeDocument/2006/math" xmlns:a14="http://schemas.microsoft.com/office/drawing/2010/main" xmlns:ma14="http://schemas.microsoft.com/office/mac/drawingml/2011/main" xmlns="" val="1"/>
             </a:ext>
           </a:extLst>
         </p:spPr>
@@ -1979,7 +1979,7 @@
           </a:ln>
           <a:extLst>
             <a:ext uri="{C572A759-6A51-4108-AA02-DFA0A04FC94B}">
-              <ma14:wrappingTextBoxFlag xmlns="" xmlns:ma14="http://schemas.microsoft.com/office/mac/drawingml/2011/main" xmlns:a14="http://schemas.microsoft.com/office/drawing/2010/main" xmlns:m="http://schemas.openxmlformats.org/officeDocument/2006/math" val="1"/>
+              <ma14:wrappingTextBoxFlag xmlns:m="http://schemas.openxmlformats.org/officeDocument/2006/math" xmlns:a14="http://schemas.microsoft.com/office/drawing/2010/main" xmlns:ma14="http://schemas.microsoft.com/office/mac/drawingml/2011/main" xmlns="" val="1"/>
             </a:ext>
           </a:extLst>
         </p:spPr>
@@ -2180,7 +2180,7 @@
           </a:ln>
           <a:extLst>
             <a:ext uri="{C572A759-6A51-4108-AA02-DFA0A04FC94B}">
-              <ma14:wrappingTextBoxFlag xmlns="" xmlns:ma14="http://schemas.microsoft.com/office/mac/drawingml/2011/main" xmlns:a14="http://schemas.microsoft.com/office/drawing/2010/main" xmlns:m="http://schemas.openxmlformats.org/officeDocument/2006/math" val="1"/>
+              <ma14:wrappingTextBoxFlag xmlns:m="http://schemas.openxmlformats.org/officeDocument/2006/math" xmlns:a14="http://schemas.microsoft.com/office/drawing/2010/main" xmlns:ma14="http://schemas.microsoft.com/office/mac/drawingml/2011/main" xmlns="" val="1"/>
             </a:ext>
           </a:extLst>
         </p:spPr>
@@ -2279,7 +2279,7 @@
           </a:ln>
           <a:extLst>
             <a:ext uri="{C572A759-6A51-4108-AA02-DFA0A04FC94B}">
-              <ma14:wrappingTextBoxFlag xmlns="" xmlns:ma14="http://schemas.microsoft.com/office/mac/drawingml/2011/main" xmlns:a14="http://schemas.microsoft.com/office/drawing/2010/main" xmlns:m="http://schemas.openxmlformats.org/officeDocument/2006/math" val="1"/>
+              <ma14:wrappingTextBoxFlag xmlns:m="http://schemas.openxmlformats.org/officeDocument/2006/math" xmlns:a14="http://schemas.microsoft.com/office/drawing/2010/main" xmlns:ma14="http://schemas.microsoft.com/office/mac/drawingml/2011/main" xmlns="" val="1"/>
             </a:ext>
           </a:extLst>
         </p:spPr>
@@ -2318,7 +2318,7 @@
           </a:ln>
           <a:extLst>
             <a:ext uri="{C572A759-6A51-4108-AA02-DFA0A04FC94B}">
-              <ma14:wrappingTextBoxFlag xmlns="" xmlns:ma14="http://schemas.microsoft.com/office/mac/drawingml/2011/main" xmlns:a14="http://schemas.microsoft.com/office/drawing/2010/main" xmlns:m="http://schemas.openxmlformats.org/officeDocument/2006/math" val="1"/>
+              <ma14:wrappingTextBoxFlag xmlns:m="http://schemas.openxmlformats.org/officeDocument/2006/math" xmlns:a14="http://schemas.microsoft.com/office/drawing/2010/main" xmlns:ma14="http://schemas.microsoft.com/office/mac/drawingml/2011/main" xmlns="" val="1"/>
             </a:ext>
           </a:extLst>
         </p:spPr>
@@ -2478,7 +2478,7 @@
           </a:ln>
           <a:extLst>
             <a:ext uri="{C572A759-6A51-4108-AA02-DFA0A04FC94B}">
-              <ma14:wrappingTextBoxFlag xmlns="" xmlns:ma14="http://schemas.microsoft.com/office/mac/drawingml/2011/main" xmlns:a14="http://schemas.microsoft.com/office/drawing/2010/main" xmlns:m="http://schemas.openxmlformats.org/officeDocument/2006/math" val="1"/>
+              <ma14:wrappingTextBoxFlag xmlns:m="http://schemas.openxmlformats.org/officeDocument/2006/math" xmlns:a14="http://schemas.microsoft.com/office/drawing/2010/main" xmlns:ma14="http://schemas.microsoft.com/office/mac/drawingml/2011/main" xmlns="" val="1"/>
             </a:ext>
           </a:extLst>
         </p:spPr>
@@ -17184,6 +17184,22 @@
 </file>
 
 <file path=customXml/item1.xml><?xml version="1.0" encoding="utf-8"?>
+<p:properties xmlns:p="http://schemas.microsoft.com/office/2006/metadata/properties" xmlns:xsi="http://www.w3.org/2001/XMLSchema-instance" xmlns:pc="http://schemas.microsoft.com/office/infopath/2007/PartnerControls">
+  <documentManagement>
+    <_dlc_DocId xmlns="ee5a019c-1afb-4a7f-aa3c-a300d54b8a94">4ZA6FPYH4N22-134279970-49061</_dlc_DocId>
+    <_dlc_DocIdUrl xmlns="ee5a019c-1afb-4a7f-aa3c-a300d54b8a94">
+      <Url>https://accedia.sharepoint.com/sites/fileshare/bizdev/_layouts/15/DocIdRedir.aspx?ID=4ZA6FPYH4N22-134279970-49061</Url>
+      <Description>4ZA6FPYH4N22-134279970-49061</Description>
+    </_dlc_DocIdUrl>
+    <TaxCatchAll xmlns="ee5a019c-1afb-4a7f-aa3c-a300d54b8a94" xsi:nil="true"/>
+    <lcf76f155ced4ddcb4097134ff3c332f xmlns="3d51c85a-c808-4fa3-a7c4-399d30d41b71">
+      <Terms xmlns="http://schemas.microsoft.com/office/infopath/2007/PartnerControls"/>
+    </lcf76f155ced4ddcb4097134ff3c332f>
+  </documentManagement>
+</p:properties>
+</file>
+
+<file path=customXml/item2.xml><?xml version="1.0" encoding="utf-8"?>
 <?mso-contentType ?>
 <spe:Receivers xmlns:spe="http://schemas.microsoft.com/sharepoint/events">
   <Receiver>
@@ -17233,32 +17249,7 @@
 </spe:Receivers>
 </file>
 
-<file path=customXml/item2.xml><?xml version="1.0" encoding="utf-8"?>
-<p:properties xmlns:p="http://schemas.microsoft.com/office/2006/metadata/properties" xmlns:xsi="http://www.w3.org/2001/XMLSchema-instance" xmlns:pc="http://schemas.microsoft.com/office/infopath/2007/PartnerControls">
-  <documentManagement>
-    <_dlc_DocId xmlns="ee5a019c-1afb-4a7f-aa3c-a300d54b8a94">4ZA6FPYH4N22-134279970-49061</_dlc_DocId>
-    <_dlc_DocIdUrl xmlns="ee5a019c-1afb-4a7f-aa3c-a300d54b8a94">
-      <Url>https://accedia.sharepoint.com/sites/fileshare/bizdev/_layouts/15/DocIdRedir.aspx?ID=4ZA6FPYH4N22-134279970-49061</Url>
-      <Description>4ZA6FPYH4N22-134279970-49061</Description>
-    </_dlc_DocIdUrl>
-    <TaxCatchAll xmlns="ee5a019c-1afb-4a7f-aa3c-a300d54b8a94" xsi:nil="true"/>
-    <lcf76f155ced4ddcb4097134ff3c332f xmlns="3d51c85a-c808-4fa3-a7c4-399d30d41b71">
-      <Terms xmlns="http://schemas.microsoft.com/office/infopath/2007/PartnerControls"/>
-    </lcf76f155ced4ddcb4097134ff3c332f>
-  </documentManagement>
-</p:properties>
-</file>
-
 <file path=customXml/item3.xml><?xml version="1.0" encoding="utf-8"?>
-<?mso-contentType ?>
-<FormTemplates xmlns="http://schemas.microsoft.com/sharepoint/v3/contenttype/forms">
-  <Display>DocumentLibraryForm</Display>
-  <Edit>DocumentLibraryForm</Edit>
-  <New>DocumentLibraryForm</New>
-</FormTemplates>
-</file>
-
-<file path=customXml/item4.xml><?xml version="1.0" encoding="utf-8"?>
 <ct:contentTypeSchema xmlns:ct="http://schemas.microsoft.com/office/2006/metadata/contentType" xmlns:ma="http://schemas.microsoft.com/office/2006/metadata/properties/metaAttributes" ct:_="" ma:_="" ma:contentTypeName="Document" ma:contentTypeID="0x0101003F118A156F01C84E8E5E451D60C9243C" ma:contentTypeVersion="18" ma:contentTypeDescription="Create a new document." ma:contentTypeScope="" ma:versionID="81bba4710e6ed34fea4bd7f33693d27f">
   <xsd:schema xmlns:xsd="http://www.w3.org/2001/XMLSchema" xmlns:xs="http://www.w3.org/2001/XMLSchema" xmlns:p="http://schemas.microsoft.com/office/2006/metadata/properties" xmlns:ns2="ee5a019c-1afb-4a7f-aa3c-a300d54b8a94" xmlns:ns3="3d51c85a-c808-4fa3-a7c4-399d30d41b71" xmlns:ns4="cabbaafa-9d61-4c96-bf36-3d40c487f168" targetNamespace="http://schemas.microsoft.com/office/2006/metadata/properties" ma:root="true" ma:fieldsID="ea50bd8bc227bb2cc5fe2d0a23ee5167" ns2:_="" ns3:_="" ns4:_="">
     <xsd:import namespace="ee5a019c-1afb-4a7f-aa3c-a300d54b8a94"/>
@@ -17531,15 +17522,16 @@
 </ct:contentTypeSchema>
 </file>
 
-<file path=customXml/itemProps1.xml><?xml version="1.0" encoding="utf-8"?>
-<ds:datastoreItem xmlns:ds="http://schemas.openxmlformats.org/officeDocument/2006/customXml" ds:itemID="{23731FFE-AA89-41C8-A8D1-96335015AC7D}">
-  <ds:schemaRefs>
-    <ds:schemaRef ds:uri="http://schemas.microsoft.com/sharepoint/events"/>
-  </ds:schemaRefs>
-</ds:datastoreItem>
+<file path=customXml/item4.xml><?xml version="1.0" encoding="utf-8"?>
+<?mso-contentType ?>
+<FormTemplates xmlns="http://schemas.microsoft.com/sharepoint/v3/contenttype/forms">
+  <Display>DocumentLibraryForm</Display>
+  <Edit>DocumentLibraryForm</Edit>
+  <New>DocumentLibraryForm</New>
+</FormTemplates>
 </file>
 
-<file path=customXml/itemProps2.xml><?xml version="1.0" encoding="utf-8"?>
+<file path=customXml/itemProps1.xml><?xml version="1.0" encoding="utf-8"?>
 <ds:datastoreItem xmlns:ds="http://schemas.openxmlformats.org/officeDocument/2006/customXml" ds:itemID="{28013F97-F744-428B-8504-911AB7D87FBC}">
   <ds:schemaRefs>
     <ds:schemaRef ds:uri="ee5a019c-1afb-4a7f-aa3c-a300d54b8a94"/>
@@ -17550,15 +17542,15 @@
 </ds:datastoreItem>
 </file>
 
-<file path=customXml/itemProps3.xml><?xml version="1.0" encoding="utf-8"?>
-<ds:datastoreItem xmlns:ds="http://schemas.openxmlformats.org/officeDocument/2006/customXml" ds:itemID="{450D9D61-AB1C-42DB-97B3-F16948BBEDA5}">
+<file path=customXml/itemProps2.xml><?xml version="1.0" encoding="utf-8"?>
+<ds:datastoreItem xmlns:ds="http://schemas.openxmlformats.org/officeDocument/2006/customXml" ds:itemID="{23731FFE-AA89-41C8-A8D1-96335015AC7D}">
   <ds:schemaRefs>
-    <ds:schemaRef ds:uri="http://schemas.microsoft.com/sharepoint/v3/contenttype/forms"/>
+    <ds:schemaRef ds:uri="http://schemas.microsoft.com/sharepoint/events"/>
   </ds:schemaRefs>
 </ds:datastoreItem>
 </file>
 
-<file path=customXml/itemProps4.xml><?xml version="1.0" encoding="utf-8"?>
+<file path=customXml/itemProps3.xml><?xml version="1.0" encoding="utf-8"?>
 <ds:datastoreItem xmlns:ds="http://schemas.openxmlformats.org/officeDocument/2006/customXml" ds:itemID="{D75CE82B-2AB8-470D-8DBA-A4AFD7F9BDEE}">
   <ds:schemaRefs>
     <ds:schemaRef ds:uri="http://schemas.microsoft.com/office/2006/metadata/contentType"/>
@@ -17576,4 +17568,12 @@
     <ds:schemaRef ds:uri="http://schemas.microsoft.com/internal/obd"/>
   </ds:schemaRefs>
 </ds:datastoreItem>
+</file>
+
+<file path=customXml/itemProps4.xml><?xml version="1.0" encoding="utf-8"?>
+<ds:datastoreItem xmlns:ds="http://schemas.openxmlformats.org/officeDocument/2006/customXml" ds:itemID="{450D9D61-AB1C-42DB-97B3-F16948BBEDA5}">
+  <ds:schemaRefs>
+    <ds:schemaRef ds:uri="http://schemas.microsoft.com/sharepoint/v3/contenttype/forms"/>
+  </ds:schemaRefs>
+</ds:datastoreItem>
 </file>
</xml_diff>